<commit_message>
update with 4 rounds of results
</commit_message>
<xml_diff>
--- a/docs/PBR.pptx
+++ b/docs/PBR.pptx
@@ -5184,7 +5184,19 @@
                 <a:latin typeface="Courier New" panose="02070309020205020404" pitchFamily="49" charset="0"/>
                 <a:cs typeface="Courier New" panose="02070309020205020404" pitchFamily="49" charset="0"/>
               </a:rPr>
-              <a:t>    while &lt; n presidents have died:</a:t>
+              <a:t>    do 10,000 times:</a:t>
+            </a:r>
+          </a:p>
+          <a:p>
+            <a:pPr marL="0" indent="0">
+              <a:buNone/>
+            </a:pPr>
+            <a:r>
+              <a:rPr lang="en-US" sz="1600" dirty="0">
+                <a:latin typeface="Courier New" panose="02070309020205020404" pitchFamily="49" charset="0"/>
+                <a:cs typeface="Courier New" panose="02070309020205020404" pitchFamily="49" charset="0"/>
+              </a:rPr>
+              <a:t>      while &lt; n presidents have died:</a:t>
             </a:r>
           </a:p>
           <a:p>
@@ -5208,19 +5220,7 @@
                 <a:latin typeface="Courier New" panose="02070309020205020404" pitchFamily="49" charset="0"/>
                 <a:cs typeface="Courier New" panose="02070309020205020404" pitchFamily="49" charset="0"/>
               </a:rPr>
-              <a:t>      do 10,000 times:</a:t>
-            </a:r>
-          </a:p>
-          <a:p>
-            <a:pPr marL="0" indent="0">
-              <a:buNone/>
-            </a:pPr>
-            <a:r>
-              <a:rPr lang="en-US" sz="1600" dirty="0">
-                <a:latin typeface="Courier New" panose="02070309020205020404" pitchFamily="49" charset="0"/>
-                <a:cs typeface="Courier New" panose="02070309020205020404" pitchFamily="49" charset="0"/>
-              </a:rPr>
-              <a:t>        the 2 presidents "fight"</a:t>
+              <a:t>      the 2 presidents "fight"</a:t>
             </a:r>
           </a:p>
           <a:p>

</xml_diff>